<commit_message>
Updated OpenRocket design parameters slide
</commit_message>
<xml_diff>
--- a/new-member-cert/Open Rocket Day.pptx
+++ b/new-member-cert/Open Rocket Day.pptx
@@ -105,6 +105,11 @@
       </a:defRPr>
     </a:lvl9pPr>
   </p:defaultTextStyle>
+  <p:extLst>
+    <p:ext uri="{EFAFB233-063F-42B5-8137-9DF3F51BA10A}">
+      <p15:sldGuideLst xmlns:p15="http://schemas.microsoft.com/office/powerpoint/2012/main"/>
+    </p:ext>
+  </p:extLst>
 </p:presentation>
 </file>
 
@@ -4028,7 +4033,6 @@
               <a:rPr lang="en-US" dirty="0"/>
               <a:t>Open Rocket Day</a:t>
             </a:r>
-            <a:endParaRPr lang="en-US"/>
           </a:p>
         </p:txBody>
       </p:sp>
@@ -4062,8 +4066,22 @@
           <a:p>
             <a:pPr algn="r"/>
             <a:r>
-              <a:rPr lang="en-US"/>
-              <a:t>Something something, kids these days staring at a computer all day</a:t>
+              <a:rPr lang="en-US" sz="1200" dirty="0">
+                <a:latin typeface="Comic Sans MS" panose="030F0702030302020204" pitchFamily="66" charset="0"/>
+              </a:rPr>
+              <a:t>Something </a:t>
+            </a:r>
+            <a:r>
+              <a:rPr lang="en-US" sz="1200" dirty="0" err="1">
+                <a:latin typeface="Comic Sans MS" panose="030F0702030302020204" pitchFamily="66" charset="0"/>
+              </a:rPr>
+              <a:t>something</a:t>
+            </a:r>
+            <a:r>
+              <a:rPr lang="en-US" sz="1200" dirty="0">
+                <a:latin typeface="Comic Sans MS" panose="030F0702030302020204" pitchFamily="66" charset="0"/>
+              </a:rPr>
+              <a:t>, kids these days staring at a computer all day</a:t>
             </a:r>
           </a:p>
         </p:txBody>
@@ -4354,7 +4372,7 @@
         </p:nvSpPr>
         <p:spPr>
           <a:xfrm>
-            <a:off x="1219200" y="365125"/>
+            <a:off x="1219200" y="83574"/>
             <a:ext cx="9493249" cy="752475"/>
           </a:xfrm>
         </p:spPr>
@@ -4366,7 +4384,7 @@
           <a:p>
             <a:r>
               <a:rPr lang="en-US" dirty="0"/>
-              <a:t>Numbers &amp; Stuff</a:t>
+              <a:t>Design Parameters</a:t>
             </a:r>
           </a:p>
         </p:txBody>
@@ -4389,96 +4407,298 @@
         </p:nvSpPr>
         <p:spPr>
           <a:xfrm>
-            <a:off x="1219200" y="1337734"/>
-            <a:ext cx="9493250" cy="4834466"/>
+            <a:off x="1219200" y="836049"/>
+            <a:ext cx="9493250" cy="6021951"/>
           </a:xfrm>
         </p:spPr>
         <p:txBody>
-          <a:bodyPr/>
-          <a:lstStyle/>
-          <a:p>
-            <a:r>
-              <a:rPr lang="en-US" dirty="0"/>
+          <a:bodyPr>
+            <a:noAutofit/>
+          </a:bodyPr>
+          <a:lstStyle/>
+          <a:p>
+            <a:pPr>
+              <a:lnSpc>
+                <a:spcPct val="100000"/>
+              </a:lnSpc>
+            </a:pPr>
+            <a:r>
+              <a:rPr lang="en-US" sz="1400" b="1" dirty="0">
+                <a:latin typeface="Trebuchet MS" panose="020B0603020202020204" pitchFamily="34" charset="0"/>
+              </a:rPr>
               <a:t>Tube</a:t>
             </a:r>
           </a:p>
           <a:p>
-            <a:pPr lvl="1"/>
-            <a:r>
-              <a:rPr lang="en-US" dirty="0"/>
-              <a:t>About 76mm Inner Diameter, 82mm Outer Diameter</a:t>
-            </a:r>
-          </a:p>
-          <a:p>
-            <a:pPr lvl="1"/>
-            <a:r>
-              <a:rPr lang="en-US" dirty="0"/>
-              <a:t>Try to keep shorter than 1m</a:t>
-            </a:r>
-          </a:p>
-          <a:p>
-            <a:r>
-              <a:rPr lang="en-US" dirty="0"/>
+            <a:pPr lvl="1">
+              <a:lnSpc>
+                <a:spcPct val="100000"/>
+              </a:lnSpc>
+            </a:pPr>
+            <a:r>
+              <a:rPr lang="en-US" b="1" dirty="0">
+                <a:latin typeface="Trebuchet MS" panose="020B0603020202020204" pitchFamily="34" charset="0"/>
+              </a:rPr>
+              <a:t>Approximately 76mm Inner Diameter (ID) and 83mm Outer Diameter (OD)</a:t>
+            </a:r>
+          </a:p>
+          <a:p>
+            <a:pPr lvl="1">
+              <a:lnSpc>
+                <a:spcPct val="100000"/>
+              </a:lnSpc>
+            </a:pPr>
+            <a:r>
+              <a:rPr lang="en-US" b="1" dirty="0">
+                <a:latin typeface="Trebuchet MS" panose="020B0603020202020204" pitchFamily="34" charset="0"/>
+              </a:rPr>
+              <a:t>Try to keep shorter than about 1.2m</a:t>
+            </a:r>
+          </a:p>
+          <a:p>
+            <a:pPr>
+              <a:lnSpc>
+                <a:spcPct val="100000"/>
+              </a:lnSpc>
+            </a:pPr>
+            <a:r>
+              <a:rPr lang="en-US" sz="1400" b="1" dirty="0">
+                <a:latin typeface="Trebuchet MS" panose="020B0603020202020204" pitchFamily="34" charset="0"/>
+              </a:rPr>
               <a:t>Nosecone</a:t>
             </a:r>
           </a:p>
           <a:p>
-            <a:pPr lvl="1"/>
-            <a:r>
-              <a:rPr lang="en-US" dirty="0"/>
+            <a:pPr lvl="1">
+              <a:lnSpc>
+                <a:spcPct val="100000"/>
+              </a:lnSpc>
+            </a:pPr>
+            <a:r>
+              <a:rPr lang="en-US" b="1" dirty="0">
+                <a:latin typeface="Trebuchet MS" panose="020B0603020202020204" pitchFamily="34" charset="0"/>
+              </a:rPr>
               <a:t>5 walls (0.4mm*5 = 2mm thick)</a:t>
             </a:r>
           </a:p>
           <a:p>
-            <a:pPr lvl="1"/>
-            <a:r>
-              <a:rPr lang="en-US" dirty="0"/>
+            <a:pPr lvl="1">
+              <a:lnSpc>
+                <a:spcPct val="100000"/>
+              </a:lnSpc>
+            </a:pPr>
+            <a:r>
+              <a:rPr lang="en-US" b="1" dirty="0">
+                <a:latin typeface="Trebuchet MS" panose="020B0603020202020204" pitchFamily="34" charset="0"/>
+              </a:rPr>
               <a:t>220mm max height with shoulder (can do a two-part, simpler not to)</a:t>
             </a:r>
           </a:p>
           <a:p>
-            <a:r>
-              <a:rPr lang="en-US" dirty="0"/>
+            <a:pPr>
+              <a:lnSpc>
+                <a:spcPct val="100000"/>
+              </a:lnSpc>
+            </a:pPr>
+            <a:r>
+              <a:rPr lang="en-US" sz="1400" b="1" dirty="0">
+                <a:latin typeface="Trebuchet MS" panose="020B0603020202020204" pitchFamily="34" charset="0"/>
+              </a:rPr>
               <a:t>Motors</a:t>
             </a:r>
           </a:p>
           <a:p>
-            <a:pPr lvl="1"/>
-            <a:r>
-              <a:rPr lang="en-US" dirty="0"/>
-              <a:t>Simulate with I140 and I175 for L1 attempt and J425 and J435 for L2 attempt</a:t>
-            </a:r>
-          </a:p>
-          <a:p>
-            <a:pPr lvl="1"/>
-            <a:r>
-              <a:rPr lang="en-US" dirty="0"/>
-              <a:t>Mount is 38mm blue tube 38.2mm ID, 41mm OD</a:t>
-            </a:r>
-          </a:p>
-          <a:p>
-            <a:r>
-              <a:rPr lang="en-US" dirty="0"/>
+            <a:pPr lvl="1">
+              <a:lnSpc>
+                <a:spcPct val="100000"/>
+              </a:lnSpc>
+            </a:pPr>
+            <a:r>
+              <a:rPr lang="en-US" b="1" dirty="0">
+                <a:latin typeface="Trebuchet MS" panose="020B0603020202020204" pitchFamily="34" charset="0"/>
+              </a:rPr>
+              <a:t>Simulate with </a:t>
+            </a:r>
+            <a:r>
+              <a:rPr lang="en-US" b="1" dirty="0" err="1">
+                <a:latin typeface="Trebuchet MS" panose="020B0603020202020204" pitchFamily="34" charset="0"/>
+              </a:rPr>
+              <a:t>AeroTech</a:t>
+            </a:r>
+            <a:r>
+              <a:rPr lang="en-US" b="1" dirty="0">
+                <a:latin typeface="Trebuchet MS" panose="020B0603020202020204" pitchFamily="34" charset="0"/>
+              </a:rPr>
+              <a:t> H283ST for L1 attempt and </a:t>
+            </a:r>
+            <a:r>
+              <a:rPr lang="en-US" b="1" dirty="0" err="1">
+                <a:latin typeface="Trebuchet MS" panose="020B0603020202020204" pitchFamily="34" charset="0"/>
+              </a:rPr>
+              <a:t>AeroTech</a:t>
+            </a:r>
+            <a:r>
+              <a:rPr lang="en-US" b="1" dirty="0">
+                <a:latin typeface="Trebuchet MS" panose="020B0603020202020204" pitchFamily="34" charset="0"/>
+              </a:rPr>
+              <a:t> J425R or J435WS for L2 attempt</a:t>
+            </a:r>
+          </a:p>
+          <a:p>
+            <a:pPr lvl="1">
+              <a:lnSpc>
+                <a:spcPct val="100000"/>
+              </a:lnSpc>
+            </a:pPr>
+            <a:r>
+              <a:rPr lang="en-US" b="1" dirty="0">
+                <a:latin typeface="Trebuchet MS" panose="020B0603020202020204" pitchFamily="34" charset="0"/>
+              </a:rPr>
+              <a:t>Motor mount is 38mm blue tube (38.4mm ID, 41.0mm OD)</a:t>
+            </a:r>
+          </a:p>
+          <a:p>
+            <a:pPr lvl="1">
+              <a:lnSpc>
+                <a:spcPct val="100000"/>
+              </a:lnSpc>
+            </a:pPr>
+            <a:r>
+              <a:rPr lang="en-US" b="1" dirty="0">
+                <a:latin typeface="Trebuchet MS" panose="020B0603020202020204" pitchFamily="34" charset="0"/>
+              </a:rPr>
+              <a:t>Leave 15-20mm of motor tube sticking out for motor retention</a:t>
+            </a:r>
+          </a:p>
+          <a:p>
+            <a:pPr>
+              <a:lnSpc>
+                <a:spcPct val="100000"/>
+              </a:lnSpc>
+            </a:pPr>
+            <a:r>
+              <a:rPr lang="en-US" sz="1400" b="1" dirty="0">
+                <a:latin typeface="Trebuchet MS" panose="020B0603020202020204" pitchFamily="34" charset="0"/>
+              </a:rPr>
+              <a:t>Centering rings</a:t>
+            </a:r>
+          </a:p>
+          <a:p>
+            <a:pPr lvl="1">
+              <a:lnSpc>
+                <a:spcPct val="100000"/>
+              </a:lnSpc>
+            </a:pPr>
+            <a:r>
+              <a:rPr lang="en-US" b="1" dirty="0">
+                <a:latin typeface="Trebuchet MS" panose="020B0603020202020204" pitchFamily="34" charset="0"/>
+              </a:rPr>
+              <a:t>Material is 0.25 inch (6.35mm) plywood</a:t>
+            </a:r>
+          </a:p>
+          <a:p>
+            <a:pPr>
+              <a:lnSpc>
+                <a:spcPct val="100000"/>
+              </a:lnSpc>
+            </a:pPr>
+            <a:r>
+              <a:rPr lang="en-US" sz="1400" b="1" dirty="0">
+                <a:latin typeface="Trebuchet MS" panose="020B0603020202020204" pitchFamily="34" charset="0"/>
+              </a:rPr>
               <a:t>Fins</a:t>
             </a:r>
           </a:p>
           <a:p>
-            <a:pPr lvl="1"/>
-            <a:r>
-              <a:rPr lang="en-US" dirty="0"/>
-              <a:t>Material is 0.25 inch plywood</a:t>
-            </a:r>
-          </a:p>
-          <a:p>
-            <a:pPr lvl="1"/>
-            <a:r>
-              <a:rPr lang="en-US" dirty="0"/>
-              <a:t>Aim for a stability of around 1.5</a:t>
-            </a:r>
-          </a:p>
-          <a:p>
-            <a:pPr lvl="1"/>
-            <a:endParaRPr lang="en-US" dirty="0"/>
+            <a:pPr lvl="1">
+              <a:lnSpc>
+                <a:spcPct val="100000"/>
+              </a:lnSpc>
+            </a:pPr>
+            <a:r>
+              <a:rPr lang="en-US" b="1" dirty="0">
+                <a:latin typeface="Trebuchet MS" panose="020B0603020202020204" pitchFamily="34" charset="0"/>
+              </a:rPr>
+              <a:t>Material is 0.25 inch (6.35mm) plywood</a:t>
+            </a:r>
+          </a:p>
+          <a:p>
+            <a:pPr lvl="1">
+              <a:lnSpc>
+                <a:spcPct val="100000"/>
+              </a:lnSpc>
+            </a:pPr>
+            <a:r>
+              <a:rPr lang="en-US" b="1" dirty="0">
+                <a:latin typeface="Trebuchet MS" panose="020B0603020202020204" pitchFamily="34" charset="0"/>
+              </a:rPr>
+              <a:t>Aim for a stability of around 1.5 in the L2 configuration (1.4-1.6 is fine)</a:t>
+            </a:r>
+          </a:p>
+          <a:p>
+            <a:pPr>
+              <a:lnSpc>
+                <a:spcPct val="100000"/>
+              </a:lnSpc>
+            </a:pPr>
+            <a:r>
+              <a:rPr lang="en-US" sz="1400" b="1" dirty="0">
+                <a:latin typeface="Trebuchet MS" panose="020B0603020202020204" pitchFamily="34" charset="0"/>
+              </a:rPr>
+              <a:t>Simulations</a:t>
+            </a:r>
+          </a:p>
+          <a:p>
+            <a:pPr lvl="1">
+              <a:lnSpc>
+                <a:spcPct val="100000"/>
+              </a:lnSpc>
+            </a:pPr>
+            <a:r>
+              <a:rPr lang="en-US" b="1" dirty="0">
+                <a:latin typeface="Trebuchet MS" panose="020B0603020202020204" pitchFamily="34" charset="0"/>
+              </a:rPr>
+              <a:t>Minimum velocity off rod of 10 m/s</a:t>
+            </a:r>
+          </a:p>
+          <a:p>
+            <a:pPr lvl="1">
+              <a:lnSpc>
+                <a:spcPct val="100000"/>
+              </a:lnSpc>
+            </a:pPr>
+            <a:r>
+              <a:rPr lang="en-US" b="1" dirty="0">
+                <a:latin typeface="Trebuchet MS" panose="020B0603020202020204" pitchFamily="34" charset="0"/>
+              </a:rPr>
+              <a:t>Maximum apogee of 12,000 ft (3,600 meters)</a:t>
+            </a:r>
+          </a:p>
+          <a:p>
+            <a:pPr lvl="1">
+              <a:lnSpc>
+                <a:spcPct val="100000"/>
+              </a:lnSpc>
+            </a:pPr>
+            <a:r>
+              <a:rPr lang="en-US" b="1" dirty="0">
+                <a:latin typeface="Trebuchet MS" panose="020B0603020202020204" pitchFamily="34" charset="0"/>
+              </a:rPr>
+              <a:t>Maximum ground hit velocity of 10 m/s (try to target 6-8 m/s)</a:t>
+            </a:r>
+            <a:endParaRPr lang="en-US" dirty="0">
+              <a:latin typeface="Trebuchet MS" panose="020B0603020202020204" pitchFamily="34" charset="0"/>
+            </a:endParaRPr>
+          </a:p>
+          <a:p>
+            <a:pPr lvl="1">
+              <a:lnSpc>
+                <a:spcPct val="100000"/>
+              </a:lnSpc>
+            </a:pPr>
+            <a:endParaRPr lang="en-US" dirty="0">
+              <a:latin typeface="Trebuchet MS" panose="020B0603020202020204" pitchFamily="34" charset="0"/>
+            </a:endParaRPr>
           </a:p>
         </p:txBody>
       </p:sp>

</xml_diff>